<commit_message>
Completed my portion of the Power Point.
</commit_message>
<xml_diff>
--- a/D&D Group Finder.pptx
+++ b/D&D Group Finder.pptx
@@ -108,6 +108,11 @@
       </a:defRPr>
     </a:lvl9pPr>
   </p:defaultTextStyle>
+  <p:extLst>
+    <p:ext uri="{EFAFB233-063F-42B5-8137-9DF3F51BA10A}">
+      <p15:sldGuideLst xmlns:p15="http://schemas.microsoft.com/office/powerpoint/2012/main"/>
+    </p:ext>
+  </p:extLst>
 </p:presentation>
 </file>
 
@@ -267,7 +272,7 @@
           <a:p>
             <a:fld id="{6444479B-705B-4489-957E-7E8A228BDFA0}" type="datetime1">
               <a:rPr lang="en-US" smtClean="0"/>
-              <a:t>5/26/2025</a:t>
+              <a:t>5/28/2025</a:t>
             </a:fld>
             <a:endParaRPr lang="en-US"/>
           </a:p>
@@ -467,7 +472,7 @@
           <a:p>
             <a:fld id="{C07B66AD-7C08-490A-ADA4-B47E10FB2407}" type="datetime1">
               <a:rPr lang="en-US" smtClean="0"/>
-              <a:t>5/26/2025</a:t>
+              <a:t>5/28/2025</a:t>
             </a:fld>
             <a:endParaRPr lang="en-US"/>
           </a:p>
@@ -726,7 +731,7 @@
           <a:p>
             <a:fld id="{05B95027-4255-49E7-9841-CD21BCC99996}" type="datetime1">
               <a:rPr lang="en-US" smtClean="0"/>
-              <a:t>5/26/2025</a:t>
+              <a:t>5/28/2025</a:t>
             </a:fld>
             <a:endParaRPr lang="en-US"/>
           </a:p>
@@ -967,7 +972,7 @@
           <a:p>
             <a:fld id="{9F89F774-3FA6-43B8-9241-99959C8FD463}" type="datetime1">
               <a:rPr lang="en-US" smtClean="0"/>
-              <a:t>5/26/2025</a:t>
+              <a:t>5/28/2025</a:t>
             </a:fld>
             <a:endParaRPr lang="en-US"/>
           </a:p>
@@ -1294,7 +1299,7 @@
           <a:p>
             <a:fld id="{F9504452-5DCC-4FE2-A5C9-8A5EF6714D65}" type="datetime1">
               <a:rPr lang="en-US" smtClean="0"/>
-              <a:t>5/26/2025</a:t>
+              <a:t>5/28/2025</a:t>
             </a:fld>
             <a:endParaRPr lang="en-US"/>
           </a:p>
@@ -1604,7 +1609,7 @@
           <a:p>
             <a:fld id="{E579ABC2-0180-4F3A-A895-A85BC724D472}" type="datetime1">
               <a:rPr lang="en-US" smtClean="0"/>
-              <a:t>5/26/2025</a:t>
+              <a:t>5/28/2025</a:t>
             </a:fld>
             <a:endParaRPr lang="en-US"/>
           </a:p>
@@ -2022,7 +2027,7 @@
           <a:p>
             <a:fld id="{6AEEA9BA-4E8F-439E-BEA4-91FBA01E3F5F}" type="datetime1">
               <a:rPr lang="en-US" smtClean="0"/>
-              <a:t>5/26/2025</a:t>
+              <a:t>5/28/2025</a:t>
             </a:fld>
             <a:endParaRPr lang="en-US"/>
           </a:p>
@@ -2164,7 +2169,7 @@
           <a:p>
             <a:fld id="{BE15BF18-0007-481C-AA29-413124BC3EE7}" type="datetime1">
               <a:rPr lang="en-US" smtClean="0"/>
-              <a:t>5/26/2025</a:t>
+              <a:t>5/28/2025</a:t>
             </a:fld>
             <a:endParaRPr lang="en-US"/>
           </a:p>
@@ -2326,7 +2331,7 @@
           <a:p>
             <a:fld id="{09BE9870-3748-43AD-B547-02A075CB4A1D}" type="datetime1">
               <a:rPr lang="en-US" smtClean="0"/>
-              <a:t>5/26/2025</a:t>
+              <a:t>5/28/2025</a:t>
             </a:fld>
             <a:endParaRPr lang="en-US"/>
           </a:p>
@@ -2643,7 +2648,7 @@
           <a:p>
             <a:fld id="{558E7897-33C5-4F1A-9307-D068E37F3DC7}" type="datetime1">
               <a:rPr lang="en-US" smtClean="0"/>
-              <a:t>5/26/2025</a:t>
+              <a:t>5/28/2025</a:t>
             </a:fld>
             <a:endParaRPr lang="en-US"/>
           </a:p>
@@ -2938,7 +2943,7 @@
           <a:p>
             <a:fld id="{82E171BA-CC09-47C8-A6DF-F5C5CB59CEEC}" type="datetime1">
               <a:rPr lang="en-US" smtClean="0"/>
-              <a:t>5/26/2025</a:t>
+              <a:t>5/28/2025</a:t>
             </a:fld>
             <a:endParaRPr lang="en-US"/>
           </a:p>
@@ -3179,7 +3184,7 @@
           <a:p>
             <a:fld id="{7DA38F49-B3E2-4BF0-BEC7-C30D34ABBB8D}" type="datetime1">
               <a:rPr lang="en-US" smtClean="0"/>
-              <a:t>5/26/2025</a:t>
+              <a:t>5/28/2025</a:t>
             </a:fld>
             <a:endParaRPr lang="en-US"/>
           </a:p>
@@ -4236,6 +4241,14 @@
 <file path=ppt/slides/slide4.xml><?xml version="1.0" encoding="utf-8"?>
 <p:sld xmlns:a="http://schemas.openxmlformats.org/drawingml/2006/main" xmlns:r="http://schemas.openxmlformats.org/officeDocument/2006/relationships" xmlns:p="http://schemas.openxmlformats.org/presentationml/2006/main">
   <p:cSld>
+    <p:bg>
+      <p:bgPr>
+        <a:solidFill>
+          <a:schemeClr val="bg1"/>
+        </a:solidFill>
+        <a:effectLst/>
+      </p:bgPr>
+    </p:bg>
     <p:spTree>
       <p:nvGrpSpPr>
         <p:cNvPr id="1" name=""/>
@@ -4250,6 +4263,130 @@
           <a:chExt cx="0" cy="0"/>
         </a:xfrm>
       </p:grpSpPr>
+      <p:cxnSp>
+        <p:nvCxnSpPr>
+          <p:cNvPr id="15" name="Straight Connector 14">
+            <a:extLst>
+              <a:ext uri="{FF2B5EF4-FFF2-40B4-BE49-F238E27FC236}">
+                <a16:creationId xmlns:a16="http://schemas.microsoft.com/office/drawing/2014/main" id="{118E06E4-607B-144B-382B-AD3D06B1EE8C}"/>
+              </a:ext>
+              <a:ext uri="{C183D7F6-B498-43B3-948B-1728B52AA6E4}">
+                <adec:decorative xmlns:adec="http://schemas.microsoft.com/office/drawing/2017/decorative" val="1"/>
+              </a:ext>
+            </a:extLst>
+          </p:cNvPr>
+          <p:cNvCxnSpPr>
+            <a:cxnSpLocks noGrp="1" noRot="1" noChangeAspect="1" noMove="1" noResize="1" noEditPoints="1" noAdjustHandles="1" noChangeArrowheads="1" noChangeShapeType="1"/>
+          </p:cNvCxnSpPr>
+          <p:nvPr>
+            <p:extLst>
+              <p:ext uri="{386F3935-93C4-4BCD-93E2-E3B085C9AB24}">
+                <p16:designElem xmlns:p16="http://schemas.microsoft.com/office/powerpoint/2015/main" val="1"/>
+              </p:ext>
+            </p:extLst>
+          </p:nvPr>
+        </p:nvCxnSpPr>
+        <p:spPr>
+          <a:xfrm>
+            <a:off x="713232" y="1031001"/>
+            <a:ext cx="978862" cy="0"/>
+          </a:xfrm>
+          <a:prstGeom prst="line">
+            <a:avLst/>
+          </a:prstGeom>
+          <a:ln w="76200"/>
+        </p:spPr>
+        <p:style>
+          <a:lnRef idx="1">
+            <a:schemeClr val="accent1"/>
+          </a:lnRef>
+          <a:fillRef idx="0">
+            <a:schemeClr val="accent1"/>
+          </a:fillRef>
+          <a:effectRef idx="0">
+            <a:schemeClr val="accent1"/>
+          </a:effectRef>
+          <a:fontRef idx="minor">
+            <a:schemeClr val="tx1"/>
+          </a:fontRef>
+        </p:style>
+      </p:cxnSp>
+      <p:sp useBgFill="1">
+        <p:nvSpPr>
+          <p:cNvPr id="17" name="Rectangle 16">
+            <a:extLst>
+              <a:ext uri="{FF2B5EF4-FFF2-40B4-BE49-F238E27FC236}">
+                <a16:creationId xmlns:a16="http://schemas.microsoft.com/office/drawing/2014/main" id="{DBDA151C-5770-45E4-AAFF-59E7F403866D}"/>
+              </a:ext>
+              <a:ext uri="{C183D7F6-B498-43B3-948B-1728B52AA6E4}">
+                <adec:decorative xmlns:adec="http://schemas.microsoft.com/office/drawing/2017/decorative" val="1"/>
+              </a:ext>
+            </a:extLst>
+          </p:cNvPr>
+          <p:cNvSpPr>
+            <a:spLocks noGrp="1" noRot="1" noChangeAspect="1" noMove="1" noResize="1" noEditPoints="1" noAdjustHandles="1" noChangeArrowheads="1" noChangeShapeType="1" noTextEdit="1"/>
+          </p:cNvSpPr>
+          <p:nvPr>
+            <p:extLst>
+              <p:ext uri="{386F3935-93C4-4BCD-93E2-E3B085C9AB24}">
+                <p16:designElem xmlns:p16="http://schemas.microsoft.com/office/powerpoint/2015/main" val="1"/>
+              </p:ext>
+            </p:extLst>
+          </p:nvPr>
+        </p:nvSpPr>
+        <p:spPr>
+          <a:xfrm>
+            <a:off x="0" y="0"/>
+            <a:ext cx="12192000" cy="6858000"/>
+          </a:xfrm>
+          <a:prstGeom prst="rect">
+            <a:avLst/>
+          </a:prstGeom>
+          <a:ln w="12700" cap="flat" cmpd="sng" algn="ctr">
+            <a:noFill/>
+            <a:prstDash val="solid"/>
+            <a:miter lim="800000"/>
+          </a:ln>
+          <a:effectLst/>
+          <a:extLst>
+            <a:ext uri="{91240B29-F687-4F45-9708-019B960494DF}">
+              <a14:hiddenLine xmlns:a14="http://schemas.microsoft.com/office/drawing/2010/main" w="12700" cap="flat" cmpd="sng" algn="ctr">
+                <a:solidFill>
+                  <a:schemeClr val="accent1">
+                    <a:shade val="50000"/>
+                  </a:schemeClr>
+                </a:solidFill>
+                <a:prstDash val="solid"/>
+                <a:miter lim="800000"/>
+              </a14:hiddenLine>
+            </a:ext>
+          </a:extLst>
+        </p:spPr>
+        <p:style>
+          <a:lnRef idx="2">
+            <a:schemeClr val="accent1">
+              <a:shade val="50000"/>
+            </a:schemeClr>
+          </a:lnRef>
+          <a:fillRef idx="1">
+            <a:schemeClr val="accent1"/>
+          </a:fillRef>
+          <a:effectRef idx="0">
+            <a:schemeClr val="accent1"/>
+          </a:effectRef>
+          <a:fontRef idx="minor">
+            <a:schemeClr val="lt1"/>
+          </a:fontRef>
+        </p:style>
+        <p:txBody>
+          <a:bodyPr rtlCol="0" anchor="ctr"/>
+          <a:lstStyle/>
+          <a:p>
+            <a:pPr algn="ctr"/>
+            <a:endParaRPr lang="en-US" dirty="0"/>
+          </a:p>
+        </p:txBody>
+      </p:sp>
       <p:sp>
         <p:nvSpPr>
           <p:cNvPr id="2" name="Title 1">
@@ -4266,65 +4403,150 @@
             <p:ph type="title"/>
           </p:nvPr>
         </p:nvSpPr>
-        <p:spPr/>
-        <p:txBody>
-          <a:bodyPr/>
+        <p:spPr>
+          <a:xfrm>
+            <a:off x="640080" y="1371600"/>
+            <a:ext cx="10890928" cy="971550"/>
+          </a:xfrm>
+        </p:spPr>
+        <p:txBody>
+          <a:bodyPr vert="horz" lIns="91440" tIns="45720" rIns="91440" bIns="45720" rtlCol="0" anchor="t">
+            <a:normAutofit/>
+          </a:bodyPr>
+          <a:lstStyle/>
+          <a:p>
+            <a:r>
+              <a:rPr lang="en-US"/>
+              <a:t>Game Master Creating a Game Group</a:t>
+            </a:r>
+            <a:endParaRPr lang="en-US" dirty="0"/>
+          </a:p>
+        </p:txBody>
+      </p:sp>
+      <p:cxnSp>
+        <p:nvCxnSpPr>
+          <p:cNvPr id="19" name="Straight Connector 18">
+            <a:extLst>
+              <a:ext uri="{FF2B5EF4-FFF2-40B4-BE49-F238E27FC236}">
+                <a16:creationId xmlns:a16="http://schemas.microsoft.com/office/drawing/2014/main" id="{39AA7464-1EB7-A869-C7D3-AA680BBA984A}"/>
+              </a:ext>
+              <a:ext uri="{C183D7F6-B498-43B3-948B-1728B52AA6E4}">
+                <adec:decorative xmlns:adec="http://schemas.microsoft.com/office/drawing/2017/decorative" val="1"/>
+              </a:ext>
+            </a:extLst>
+          </p:cNvPr>
+          <p:cNvCxnSpPr>
+            <a:cxnSpLocks noGrp="1" noRot="1" noChangeAspect="1" noMove="1" noResize="1" noEditPoints="1" noAdjustHandles="1" noChangeArrowheads="1" noChangeShapeType="1"/>
+          </p:cNvCxnSpPr>
+          <p:nvPr>
+            <p:extLst>
+              <p:ext uri="{386F3935-93C4-4BCD-93E2-E3B085C9AB24}">
+                <p16:designElem xmlns:p16="http://schemas.microsoft.com/office/powerpoint/2015/main" val="1"/>
+              </p:ext>
+            </p:extLst>
+          </p:nvPr>
+        </p:nvCxnSpPr>
+        <p:spPr>
+          <a:xfrm>
+            <a:off x="713232" y="1031001"/>
+            <a:ext cx="978862" cy="0"/>
+          </a:xfrm>
+          <a:prstGeom prst="line">
+            <a:avLst/>
+          </a:prstGeom>
+          <a:ln w="76200"/>
+        </p:spPr>
+        <p:style>
+          <a:lnRef idx="1">
+            <a:schemeClr val="accent1"/>
+          </a:lnRef>
+          <a:fillRef idx="0">
+            <a:schemeClr val="accent1"/>
+          </a:fillRef>
+          <a:effectRef idx="0">
+            <a:schemeClr val="accent1"/>
+          </a:effectRef>
+          <a:fontRef idx="minor">
+            <a:schemeClr val="tx1"/>
+          </a:fontRef>
+        </p:style>
+      </p:cxnSp>
+      <p:pic>
+        <p:nvPicPr>
+          <p:cNvPr id="10" name="Content Placeholder 9" descr="A screenshot of a computer&#10;&#10;AI-generated content may be incorrect.">
+            <a:extLst>
+              <a:ext uri="{FF2B5EF4-FFF2-40B4-BE49-F238E27FC236}">
+                <a16:creationId xmlns:a16="http://schemas.microsoft.com/office/drawing/2014/main" id="{89FC2060-F0BB-BDD9-FC1A-FC7BF12EA827}"/>
+              </a:ext>
+            </a:extLst>
+          </p:cNvPr>
+          <p:cNvPicPr>
+            <a:picLocks noGrp="1" noChangeAspect="1"/>
+          </p:cNvPicPr>
+          <p:nvPr>
+            <p:ph sz="half" idx="2"/>
+          </p:nvPr>
+        </p:nvPicPr>
+        <p:blipFill>
+          <a:blip r:embed="rId2">
+            <a:extLst>
+              <a:ext uri="{28A0092B-C50C-407E-A947-70E740481C1C}">
+                <a14:useLocalDpi xmlns:a14="http://schemas.microsoft.com/office/drawing/2010/main" val="0"/>
+              </a:ext>
+            </a:extLst>
+          </a:blip>
+          <a:stretch>
+            <a:fillRect/>
+          </a:stretch>
+        </p:blipFill>
+        <p:spPr>
+          <a:xfrm>
+            <a:off x="713232" y="2913859"/>
+            <a:ext cx="5648193" cy="3007661"/>
+          </a:xfrm>
+          <a:prstGeom prst="rect">
+            <a:avLst/>
+          </a:prstGeom>
+        </p:spPr>
+      </p:pic>
+      <p:sp>
+        <p:nvSpPr>
+          <p:cNvPr id="3" name="Content Placeholder 2">
+            <a:extLst>
+              <a:ext uri="{FF2B5EF4-FFF2-40B4-BE49-F238E27FC236}">
+                <a16:creationId xmlns:a16="http://schemas.microsoft.com/office/drawing/2014/main" id="{95C03367-319B-5244-8F1C-9DD5B1650720}"/>
+              </a:ext>
+            </a:extLst>
+          </p:cNvPr>
+          <p:cNvSpPr>
+            <a:spLocks noGrp="1"/>
+          </p:cNvSpPr>
+          <p:nvPr>
+            <p:ph sz="half" idx="1"/>
+          </p:nvPr>
+        </p:nvSpPr>
+        <p:spPr>
+          <a:xfrm>
+            <a:off x="6871063" y="2537460"/>
+            <a:ext cx="4659945" cy="3760459"/>
+          </a:xfrm>
+        </p:spPr>
+        <p:txBody>
+          <a:bodyPr vert="horz" lIns="91440" tIns="45720" rIns="91440" bIns="45720" rtlCol="0" anchor="t">
+            <a:normAutofit/>
+          </a:bodyPr>
           <a:lstStyle/>
           <a:p>
             <a:r>
               <a:rPr lang="en-US" dirty="0"/>
-              <a:t>Game Master Use Case</a:t>
-            </a:r>
-          </a:p>
-        </p:txBody>
-      </p:sp>
-      <p:sp>
-        <p:nvSpPr>
-          <p:cNvPr id="3" name="Content Placeholder 2">
-            <a:extLst>
-              <a:ext uri="{FF2B5EF4-FFF2-40B4-BE49-F238E27FC236}">
-                <a16:creationId xmlns:a16="http://schemas.microsoft.com/office/drawing/2014/main" id="{95C03367-319B-5244-8F1C-9DD5B1650720}"/>
-              </a:ext>
-            </a:extLst>
-          </p:cNvPr>
-          <p:cNvSpPr>
-            <a:spLocks noGrp="1"/>
-          </p:cNvSpPr>
-          <p:nvPr>
-            <p:ph sz="half" idx="1"/>
-          </p:nvPr>
-        </p:nvSpPr>
-        <p:spPr/>
-        <p:txBody>
-          <a:bodyPr/>
-          <a:lstStyle/>
-          <a:p>
-            <a:endParaRPr lang="en-US"/>
-          </a:p>
-        </p:txBody>
-      </p:sp>
-      <p:sp>
-        <p:nvSpPr>
-          <p:cNvPr id="4" name="Content Placeholder 3">
-            <a:extLst>
-              <a:ext uri="{FF2B5EF4-FFF2-40B4-BE49-F238E27FC236}">
-                <a16:creationId xmlns:a16="http://schemas.microsoft.com/office/drawing/2014/main" id="{4BB6D2E1-8E1B-828F-00BD-5D26C0931EE1}"/>
-              </a:ext>
-            </a:extLst>
-          </p:cNvPr>
-          <p:cNvSpPr>
-            <a:spLocks noGrp="1"/>
-          </p:cNvSpPr>
-          <p:nvPr>
-            <p:ph sz="half" idx="2"/>
-          </p:nvPr>
-        </p:nvSpPr>
-        <p:spPr/>
-        <p:txBody>
-          <a:bodyPr/>
-          <a:lstStyle/>
-          <a:p>
-            <a:endParaRPr lang="en-US"/>
+              <a:t>On this page, a game master user can create a game group, which would be added to a database of all game group.</a:t>
+            </a:r>
+          </a:p>
+          <a:p>
+            <a:r>
+              <a:rPr lang="en-US" dirty="0"/>
+              <a:t>They will need to enter all the information, which includes the location, the day of the week the game will be played, start/end time, number of player slots, and the description.</a:t>
+            </a:r>
           </a:p>
         </p:txBody>
       </p:sp>
@@ -4344,6 +4566,14 @@
 <file path=ppt/slides/slide5.xml><?xml version="1.0" encoding="utf-8"?>
 <p:sld xmlns:a="http://schemas.openxmlformats.org/drawingml/2006/main" xmlns:r="http://schemas.openxmlformats.org/officeDocument/2006/relationships" xmlns:p="http://schemas.openxmlformats.org/presentationml/2006/main">
   <p:cSld>
+    <p:bg>
+      <p:bgPr>
+        <a:solidFill>
+          <a:schemeClr val="bg1"/>
+        </a:solidFill>
+        <a:effectLst/>
+      </p:bgPr>
+    </p:bg>
     <p:spTree>
       <p:nvGrpSpPr>
         <p:cNvPr id="1" name=""/>
@@ -4358,6 +4588,130 @@
           <a:chExt cx="0" cy="0"/>
         </a:xfrm>
       </p:grpSpPr>
+      <p:cxnSp>
+        <p:nvCxnSpPr>
+          <p:cNvPr id="11" name="Straight Connector 10">
+            <a:extLst>
+              <a:ext uri="{FF2B5EF4-FFF2-40B4-BE49-F238E27FC236}">
+                <a16:creationId xmlns:a16="http://schemas.microsoft.com/office/drawing/2014/main" id="{118E06E4-607B-144B-382B-AD3D06B1EE8C}"/>
+              </a:ext>
+              <a:ext uri="{C183D7F6-B498-43B3-948B-1728B52AA6E4}">
+                <adec:decorative xmlns:adec="http://schemas.microsoft.com/office/drawing/2017/decorative" val="1"/>
+              </a:ext>
+            </a:extLst>
+          </p:cNvPr>
+          <p:cNvCxnSpPr>
+            <a:cxnSpLocks noGrp="1" noRot="1" noChangeAspect="1" noMove="1" noResize="1" noEditPoints="1" noAdjustHandles="1" noChangeArrowheads="1" noChangeShapeType="1"/>
+          </p:cNvCxnSpPr>
+          <p:nvPr>
+            <p:extLst>
+              <p:ext uri="{386F3935-93C4-4BCD-93E2-E3B085C9AB24}">
+                <p16:designElem xmlns:p16="http://schemas.microsoft.com/office/powerpoint/2015/main" val="1"/>
+              </p:ext>
+            </p:extLst>
+          </p:nvPr>
+        </p:nvCxnSpPr>
+        <p:spPr>
+          <a:xfrm>
+            <a:off x="713232" y="1031001"/>
+            <a:ext cx="978862" cy="0"/>
+          </a:xfrm>
+          <a:prstGeom prst="line">
+            <a:avLst/>
+          </a:prstGeom>
+          <a:ln w="76200"/>
+        </p:spPr>
+        <p:style>
+          <a:lnRef idx="1">
+            <a:schemeClr val="accent1"/>
+          </a:lnRef>
+          <a:fillRef idx="0">
+            <a:schemeClr val="accent1"/>
+          </a:fillRef>
+          <a:effectRef idx="0">
+            <a:schemeClr val="accent1"/>
+          </a:effectRef>
+          <a:fontRef idx="minor">
+            <a:schemeClr val="tx1"/>
+          </a:fontRef>
+        </p:style>
+      </p:cxnSp>
+      <p:sp useBgFill="1">
+        <p:nvSpPr>
+          <p:cNvPr id="13" name="Rectangle 12">
+            <a:extLst>
+              <a:ext uri="{FF2B5EF4-FFF2-40B4-BE49-F238E27FC236}">
+                <a16:creationId xmlns:a16="http://schemas.microsoft.com/office/drawing/2014/main" id="{DBDA151C-5770-45E4-AAFF-59E7F403866D}"/>
+              </a:ext>
+              <a:ext uri="{C183D7F6-B498-43B3-948B-1728B52AA6E4}">
+                <adec:decorative xmlns:adec="http://schemas.microsoft.com/office/drawing/2017/decorative" val="1"/>
+              </a:ext>
+            </a:extLst>
+          </p:cNvPr>
+          <p:cNvSpPr>
+            <a:spLocks noGrp="1" noRot="1" noChangeAspect="1" noMove="1" noResize="1" noEditPoints="1" noAdjustHandles="1" noChangeArrowheads="1" noChangeShapeType="1" noTextEdit="1"/>
+          </p:cNvSpPr>
+          <p:nvPr>
+            <p:extLst>
+              <p:ext uri="{386F3935-93C4-4BCD-93E2-E3B085C9AB24}">
+                <p16:designElem xmlns:p16="http://schemas.microsoft.com/office/powerpoint/2015/main" val="1"/>
+              </p:ext>
+            </p:extLst>
+          </p:nvPr>
+        </p:nvSpPr>
+        <p:spPr>
+          <a:xfrm>
+            <a:off x="0" y="0"/>
+            <a:ext cx="12192000" cy="6858000"/>
+          </a:xfrm>
+          <a:prstGeom prst="rect">
+            <a:avLst/>
+          </a:prstGeom>
+          <a:ln w="12700" cap="flat" cmpd="sng" algn="ctr">
+            <a:noFill/>
+            <a:prstDash val="solid"/>
+            <a:miter lim="800000"/>
+          </a:ln>
+          <a:effectLst/>
+          <a:extLst>
+            <a:ext uri="{91240B29-F687-4F45-9708-019B960494DF}">
+              <a14:hiddenLine xmlns:a14="http://schemas.microsoft.com/office/drawing/2010/main" w="12700" cap="flat" cmpd="sng" algn="ctr">
+                <a:solidFill>
+                  <a:schemeClr val="accent1">
+                    <a:shade val="50000"/>
+                  </a:schemeClr>
+                </a:solidFill>
+                <a:prstDash val="solid"/>
+                <a:miter lim="800000"/>
+              </a14:hiddenLine>
+            </a:ext>
+          </a:extLst>
+        </p:spPr>
+        <p:style>
+          <a:lnRef idx="2">
+            <a:schemeClr val="accent1">
+              <a:shade val="50000"/>
+            </a:schemeClr>
+          </a:lnRef>
+          <a:fillRef idx="1">
+            <a:schemeClr val="accent1"/>
+          </a:fillRef>
+          <a:effectRef idx="0">
+            <a:schemeClr val="accent1"/>
+          </a:effectRef>
+          <a:fontRef idx="minor">
+            <a:schemeClr val="lt1"/>
+          </a:fontRef>
+        </p:style>
+        <p:txBody>
+          <a:bodyPr rtlCol="0" anchor="ctr"/>
+          <a:lstStyle/>
+          <a:p>
+            <a:pPr algn="ctr"/>
+            <a:endParaRPr lang="en-US" dirty="0"/>
+          </a:p>
+        </p:txBody>
+      </p:sp>
       <p:sp>
         <p:nvSpPr>
           <p:cNvPr id="2" name="Title 1">
@@ -4374,18 +4728,111 @@
             <p:ph type="title"/>
           </p:nvPr>
         </p:nvSpPr>
-        <p:spPr/>
-        <p:txBody>
-          <a:bodyPr/>
+        <p:spPr>
+          <a:xfrm>
+            <a:off x="640080" y="1371600"/>
+            <a:ext cx="10890928" cy="971550"/>
+          </a:xfrm>
+        </p:spPr>
+        <p:txBody>
+          <a:bodyPr vert="horz" lIns="91440" tIns="45720" rIns="91440" bIns="45720" rtlCol="0" anchor="t">
+            <a:normAutofit/>
+          </a:bodyPr>
           <a:lstStyle/>
           <a:p>
             <a:r>
               <a:rPr lang="en-US" dirty="0"/>
-              <a:t>Game Master Use Case</a:t>
-            </a:r>
-          </a:p>
-        </p:txBody>
-      </p:sp>
+              <a:t>Game Master Viewing Their Game Group</a:t>
+            </a:r>
+          </a:p>
+        </p:txBody>
+      </p:sp>
+      <p:cxnSp>
+        <p:nvCxnSpPr>
+          <p:cNvPr id="15" name="Straight Connector 14">
+            <a:extLst>
+              <a:ext uri="{FF2B5EF4-FFF2-40B4-BE49-F238E27FC236}">
+                <a16:creationId xmlns:a16="http://schemas.microsoft.com/office/drawing/2014/main" id="{39AA7464-1EB7-A869-C7D3-AA680BBA984A}"/>
+              </a:ext>
+              <a:ext uri="{C183D7F6-B498-43B3-948B-1728B52AA6E4}">
+                <adec:decorative xmlns:adec="http://schemas.microsoft.com/office/drawing/2017/decorative" val="1"/>
+              </a:ext>
+            </a:extLst>
+          </p:cNvPr>
+          <p:cNvCxnSpPr>
+            <a:cxnSpLocks noGrp="1" noRot="1" noChangeAspect="1" noMove="1" noResize="1" noEditPoints="1" noAdjustHandles="1" noChangeArrowheads="1" noChangeShapeType="1"/>
+          </p:cNvCxnSpPr>
+          <p:nvPr>
+            <p:extLst>
+              <p:ext uri="{386F3935-93C4-4BCD-93E2-E3B085C9AB24}">
+                <p16:designElem xmlns:p16="http://schemas.microsoft.com/office/powerpoint/2015/main" val="1"/>
+              </p:ext>
+            </p:extLst>
+          </p:nvPr>
+        </p:nvCxnSpPr>
+        <p:spPr>
+          <a:xfrm>
+            <a:off x="713232" y="1031001"/>
+            <a:ext cx="978862" cy="0"/>
+          </a:xfrm>
+          <a:prstGeom prst="line">
+            <a:avLst/>
+          </a:prstGeom>
+          <a:ln w="76200"/>
+        </p:spPr>
+        <p:style>
+          <a:lnRef idx="1">
+            <a:schemeClr val="accent1"/>
+          </a:lnRef>
+          <a:fillRef idx="0">
+            <a:schemeClr val="accent1"/>
+          </a:fillRef>
+          <a:effectRef idx="0">
+            <a:schemeClr val="accent1"/>
+          </a:effectRef>
+          <a:fontRef idx="minor">
+            <a:schemeClr val="tx1"/>
+          </a:fontRef>
+        </p:style>
+      </p:cxnSp>
+      <p:pic>
+        <p:nvPicPr>
+          <p:cNvPr id="6" name="Content Placeholder 5" descr="A screenshot of a computer&#10;&#10;AI-generated content may be incorrect.">
+            <a:extLst>
+              <a:ext uri="{FF2B5EF4-FFF2-40B4-BE49-F238E27FC236}">
+                <a16:creationId xmlns:a16="http://schemas.microsoft.com/office/drawing/2014/main" id="{AA2BCE50-646E-B480-02C2-B73ADCD1DF44}"/>
+              </a:ext>
+            </a:extLst>
+          </p:cNvPr>
+          <p:cNvPicPr>
+            <a:picLocks noGrp="1" noChangeAspect="1"/>
+          </p:cNvPicPr>
+          <p:nvPr>
+            <p:ph sz="half" idx="2"/>
+          </p:nvPr>
+        </p:nvPicPr>
+        <p:blipFill>
+          <a:blip r:embed="rId2">
+            <a:extLst>
+              <a:ext uri="{28A0092B-C50C-407E-A947-70E740481C1C}">
+                <a14:useLocalDpi xmlns:a14="http://schemas.microsoft.com/office/drawing/2010/main" val="0"/>
+              </a:ext>
+            </a:extLst>
+          </a:blip>
+          <a:stretch>
+            <a:fillRect/>
+          </a:stretch>
+        </p:blipFill>
+        <p:spPr>
+          <a:xfrm>
+            <a:off x="713232" y="2913859"/>
+            <a:ext cx="5648193" cy="3007661"/>
+          </a:xfrm>
+          <a:prstGeom prst="rect">
+            <a:avLst/>
+          </a:prstGeom>
+        </p:spPr>
+      </p:pic>
       <p:sp>
         <p:nvSpPr>
           <p:cNvPr id="3" name="Content Placeholder 2">
@@ -4402,37 +4849,34 @@
             <p:ph sz="half" idx="1"/>
           </p:nvPr>
         </p:nvSpPr>
-        <p:spPr/>
-        <p:txBody>
-          <a:bodyPr/>
-          <a:lstStyle/>
-          <a:p>
-            <a:endParaRPr lang="en-US"/>
-          </a:p>
-        </p:txBody>
-      </p:sp>
-      <p:sp>
-        <p:nvSpPr>
-          <p:cNvPr id="4" name="Content Placeholder 3">
-            <a:extLst>
-              <a:ext uri="{FF2B5EF4-FFF2-40B4-BE49-F238E27FC236}">
-                <a16:creationId xmlns:a16="http://schemas.microsoft.com/office/drawing/2014/main" id="{035772CE-2162-9C28-EDA8-7726D587EF1D}"/>
-              </a:ext>
-            </a:extLst>
-          </p:cNvPr>
-          <p:cNvSpPr>
-            <a:spLocks noGrp="1"/>
-          </p:cNvSpPr>
-          <p:nvPr>
-            <p:ph sz="half" idx="2"/>
-          </p:nvPr>
-        </p:nvSpPr>
-        <p:spPr/>
-        <p:txBody>
-          <a:bodyPr/>
-          <a:lstStyle/>
-          <a:p>
-            <a:endParaRPr lang="en-US"/>
+        <p:spPr>
+          <a:xfrm>
+            <a:off x="6871063" y="2537460"/>
+            <a:ext cx="4659945" cy="3760459"/>
+          </a:xfrm>
+        </p:spPr>
+        <p:txBody>
+          <a:bodyPr vert="horz" lIns="91440" tIns="45720" rIns="91440" bIns="45720" rtlCol="0" anchor="t">
+            <a:normAutofit/>
+          </a:bodyPr>
+          <a:lstStyle/>
+          <a:p>
+            <a:r>
+              <a:rPr lang="en-US" dirty="0"/>
+              <a:t>This page allows a Game Master user to view all game groups that they are the game master of.</a:t>
+            </a:r>
+          </a:p>
+          <a:p>
+            <a:r>
+              <a:rPr lang="en-US" dirty="0"/>
+              <a:t>This would include all the information they entered before, plus any Player users that may have joined.</a:t>
+            </a:r>
+          </a:p>
+          <a:p>
+            <a:r>
+              <a:rPr lang="en-US" dirty="0"/>
+              <a:t>This page will also allow a Game Master user to kick a player from one of their game groups</a:t>
+            </a:r>
           </a:p>
         </p:txBody>
       </p:sp>

</xml_diff>

<commit_message>
updating my branch with Power Point changes
</commit_message>
<xml_diff>
--- a/D&D Group Finder.pptx
+++ b/D&D Group Finder.pptx
@@ -108,6 +108,11 @@
       </a:defRPr>
     </a:lvl9pPr>
   </p:defaultTextStyle>
+  <p:extLst>
+    <p:ext uri="{EFAFB233-063F-42B5-8137-9DF3F51BA10A}">
+      <p15:sldGuideLst xmlns:p15="http://schemas.microsoft.com/office/powerpoint/2012/main"/>
+    </p:ext>
+  </p:extLst>
 </p:presentation>
 </file>
 
@@ -267,7 +272,7 @@
           <a:p>
             <a:fld id="{6444479B-705B-4489-957E-7E8A228BDFA0}" type="datetime1">
               <a:rPr lang="en-US" smtClean="0"/>
-              <a:t>5/26/2025</a:t>
+              <a:t>5/28/2025</a:t>
             </a:fld>
             <a:endParaRPr lang="en-US"/>
           </a:p>
@@ -467,7 +472,7 @@
           <a:p>
             <a:fld id="{C07B66AD-7C08-490A-ADA4-B47E10FB2407}" type="datetime1">
               <a:rPr lang="en-US" smtClean="0"/>
-              <a:t>5/26/2025</a:t>
+              <a:t>5/28/2025</a:t>
             </a:fld>
             <a:endParaRPr lang="en-US"/>
           </a:p>
@@ -726,7 +731,7 @@
           <a:p>
             <a:fld id="{05B95027-4255-49E7-9841-CD21BCC99996}" type="datetime1">
               <a:rPr lang="en-US" smtClean="0"/>
-              <a:t>5/26/2025</a:t>
+              <a:t>5/28/2025</a:t>
             </a:fld>
             <a:endParaRPr lang="en-US"/>
           </a:p>
@@ -967,7 +972,7 @@
           <a:p>
             <a:fld id="{9F89F774-3FA6-43B8-9241-99959C8FD463}" type="datetime1">
               <a:rPr lang="en-US" smtClean="0"/>
-              <a:t>5/26/2025</a:t>
+              <a:t>5/28/2025</a:t>
             </a:fld>
             <a:endParaRPr lang="en-US"/>
           </a:p>
@@ -1294,7 +1299,7 @@
           <a:p>
             <a:fld id="{F9504452-5DCC-4FE2-A5C9-8A5EF6714D65}" type="datetime1">
               <a:rPr lang="en-US" smtClean="0"/>
-              <a:t>5/26/2025</a:t>
+              <a:t>5/28/2025</a:t>
             </a:fld>
             <a:endParaRPr lang="en-US"/>
           </a:p>
@@ -1604,7 +1609,7 @@
           <a:p>
             <a:fld id="{E579ABC2-0180-4F3A-A895-A85BC724D472}" type="datetime1">
               <a:rPr lang="en-US" smtClean="0"/>
-              <a:t>5/26/2025</a:t>
+              <a:t>5/28/2025</a:t>
             </a:fld>
             <a:endParaRPr lang="en-US"/>
           </a:p>
@@ -2022,7 +2027,7 @@
           <a:p>
             <a:fld id="{6AEEA9BA-4E8F-439E-BEA4-91FBA01E3F5F}" type="datetime1">
               <a:rPr lang="en-US" smtClean="0"/>
-              <a:t>5/26/2025</a:t>
+              <a:t>5/28/2025</a:t>
             </a:fld>
             <a:endParaRPr lang="en-US"/>
           </a:p>
@@ -2164,7 +2169,7 @@
           <a:p>
             <a:fld id="{BE15BF18-0007-481C-AA29-413124BC3EE7}" type="datetime1">
               <a:rPr lang="en-US" smtClean="0"/>
-              <a:t>5/26/2025</a:t>
+              <a:t>5/28/2025</a:t>
             </a:fld>
             <a:endParaRPr lang="en-US"/>
           </a:p>
@@ -2326,7 +2331,7 @@
           <a:p>
             <a:fld id="{09BE9870-3748-43AD-B547-02A075CB4A1D}" type="datetime1">
               <a:rPr lang="en-US" smtClean="0"/>
-              <a:t>5/26/2025</a:t>
+              <a:t>5/28/2025</a:t>
             </a:fld>
             <a:endParaRPr lang="en-US"/>
           </a:p>
@@ -2643,7 +2648,7 @@
           <a:p>
             <a:fld id="{558E7897-33C5-4F1A-9307-D068E37F3DC7}" type="datetime1">
               <a:rPr lang="en-US" smtClean="0"/>
-              <a:t>5/26/2025</a:t>
+              <a:t>5/28/2025</a:t>
             </a:fld>
             <a:endParaRPr lang="en-US"/>
           </a:p>
@@ -2938,7 +2943,7 @@
           <a:p>
             <a:fld id="{82E171BA-CC09-47C8-A6DF-F5C5CB59CEEC}" type="datetime1">
               <a:rPr lang="en-US" smtClean="0"/>
-              <a:t>5/26/2025</a:t>
+              <a:t>5/28/2025</a:t>
             </a:fld>
             <a:endParaRPr lang="en-US"/>
           </a:p>
@@ -3179,7 +3184,7 @@
           <a:p>
             <a:fld id="{7DA38F49-B3E2-4BF0-BEC7-C30D34ABBB8D}" type="datetime1">
               <a:rPr lang="en-US" smtClean="0"/>
-              <a:t>5/26/2025</a:t>
+              <a:t>5/28/2025</a:t>
             </a:fld>
             <a:endParaRPr lang="en-US"/>
           </a:p>
@@ -4236,6 +4241,14 @@
 <file path=ppt/slides/slide4.xml><?xml version="1.0" encoding="utf-8"?>
 <p:sld xmlns:a="http://schemas.openxmlformats.org/drawingml/2006/main" xmlns:r="http://schemas.openxmlformats.org/officeDocument/2006/relationships" xmlns:p="http://schemas.openxmlformats.org/presentationml/2006/main">
   <p:cSld>
+    <p:bg>
+      <p:bgPr>
+        <a:solidFill>
+          <a:schemeClr val="bg1"/>
+        </a:solidFill>
+        <a:effectLst/>
+      </p:bgPr>
+    </p:bg>
     <p:spTree>
       <p:nvGrpSpPr>
         <p:cNvPr id="1" name=""/>
@@ -4250,6 +4263,130 @@
           <a:chExt cx="0" cy="0"/>
         </a:xfrm>
       </p:grpSpPr>
+      <p:cxnSp>
+        <p:nvCxnSpPr>
+          <p:cNvPr id="15" name="Straight Connector 14">
+            <a:extLst>
+              <a:ext uri="{FF2B5EF4-FFF2-40B4-BE49-F238E27FC236}">
+                <a16:creationId xmlns:a16="http://schemas.microsoft.com/office/drawing/2014/main" id="{118E06E4-607B-144B-382B-AD3D06B1EE8C}"/>
+              </a:ext>
+              <a:ext uri="{C183D7F6-B498-43B3-948B-1728B52AA6E4}">
+                <adec:decorative xmlns:adec="http://schemas.microsoft.com/office/drawing/2017/decorative" val="1"/>
+              </a:ext>
+            </a:extLst>
+          </p:cNvPr>
+          <p:cNvCxnSpPr>
+            <a:cxnSpLocks noGrp="1" noRot="1" noChangeAspect="1" noMove="1" noResize="1" noEditPoints="1" noAdjustHandles="1" noChangeArrowheads="1" noChangeShapeType="1"/>
+          </p:cNvCxnSpPr>
+          <p:nvPr>
+            <p:extLst>
+              <p:ext uri="{386F3935-93C4-4BCD-93E2-E3B085C9AB24}">
+                <p16:designElem xmlns:p16="http://schemas.microsoft.com/office/powerpoint/2015/main" val="1"/>
+              </p:ext>
+            </p:extLst>
+          </p:nvPr>
+        </p:nvCxnSpPr>
+        <p:spPr>
+          <a:xfrm>
+            <a:off x="713232" y="1031001"/>
+            <a:ext cx="978862" cy="0"/>
+          </a:xfrm>
+          <a:prstGeom prst="line">
+            <a:avLst/>
+          </a:prstGeom>
+          <a:ln w="76200"/>
+        </p:spPr>
+        <p:style>
+          <a:lnRef idx="1">
+            <a:schemeClr val="accent1"/>
+          </a:lnRef>
+          <a:fillRef idx="0">
+            <a:schemeClr val="accent1"/>
+          </a:fillRef>
+          <a:effectRef idx="0">
+            <a:schemeClr val="accent1"/>
+          </a:effectRef>
+          <a:fontRef idx="minor">
+            <a:schemeClr val="tx1"/>
+          </a:fontRef>
+        </p:style>
+      </p:cxnSp>
+      <p:sp useBgFill="1">
+        <p:nvSpPr>
+          <p:cNvPr id="17" name="Rectangle 16">
+            <a:extLst>
+              <a:ext uri="{FF2B5EF4-FFF2-40B4-BE49-F238E27FC236}">
+                <a16:creationId xmlns:a16="http://schemas.microsoft.com/office/drawing/2014/main" id="{DBDA151C-5770-45E4-AAFF-59E7F403866D}"/>
+              </a:ext>
+              <a:ext uri="{C183D7F6-B498-43B3-948B-1728B52AA6E4}">
+                <adec:decorative xmlns:adec="http://schemas.microsoft.com/office/drawing/2017/decorative" val="1"/>
+              </a:ext>
+            </a:extLst>
+          </p:cNvPr>
+          <p:cNvSpPr>
+            <a:spLocks noGrp="1" noRot="1" noChangeAspect="1" noMove="1" noResize="1" noEditPoints="1" noAdjustHandles="1" noChangeArrowheads="1" noChangeShapeType="1" noTextEdit="1"/>
+          </p:cNvSpPr>
+          <p:nvPr>
+            <p:extLst>
+              <p:ext uri="{386F3935-93C4-4BCD-93E2-E3B085C9AB24}">
+                <p16:designElem xmlns:p16="http://schemas.microsoft.com/office/powerpoint/2015/main" val="1"/>
+              </p:ext>
+            </p:extLst>
+          </p:nvPr>
+        </p:nvSpPr>
+        <p:spPr>
+          <a:xfrm>
+            <a:off x="0" y="0"/>
+            <a:ext cx="12192000" cy="6858000"/>
+          </a:xfrm>
+          <a:prstGeom prst="rect">
+            <a:avLst/>
+          </a:prstGeom>
+          <a:ln w="12700" cap="flat" cmpd="sng" algn="ctr">
+            <a:noFill/>
+            <a:prstDash val="solid"/>
+            <a:miter lim="800000"/>
+          </a:ln>
+          <a:effectLst/>
+          <a:extLst>
+            <a:ext uri="{91240B29-F687-4F45-9708-019B960494DF}">
+              <a14:hiddenLine xmlns:a14="http://schemas.microsoft.com/office/drawing/2010/main" w="12700" cap="flat" cmpd="sng" algn="ctr">
+                <a:solidFill>
+                  <a:schemeClr val="accent1">
+                    <a:shade val="50000"/>
+                  </a:schemeClr>
+                </a:solidFill>
+                <a:prstDash val="solid"/>
+                <a:miter lim="800000"/>
+              </a14:hiddenLine>
+            </a:ext>
+          </a:extLst>
+        </p:spPr>
+        <p:style>
+          <a:lnRef idx="2">
+            <a:schemeClr val="accent1">
+              <a:shade val="50000"/>
+            </a:schemeClr>
+          </a:lnRef>
+          <a:fillRef idx="1">
+            <a:schemeClr val="accent1"/>
+          </a:fillRef>
+          <a:effectRef idx="0">
+            <a:schemeClr val="accent1"/>
+          </a:effectRef>
+          <a:fontRef idx="minor">
+            <a:schemeClr val="lt1"/>
+          </a:fontRef>
+        </p:style>
+        <p:txBody>
+          <a:bodyPr rtlCol="0" anchor="ctr"/>
+          <a:lstStyle/>
+          <a:p>
+            <a:pPr algn="ctr"/>
+            <a:endParaRPr lang="en-US" dirty="0"/>
+          </a:p>
+        </p:txBody>
+      </p:sp>
       <p:sp>
         <p:nvSpPr>
           <p:cNvPr id="2" name="Title 1">
@@ -4266,65 +4403,150 @@
             <p:ph type="title"/>
           </p:nvPr>
         </p:nvSpPr>
-        <p:spPr/>
-        <p:txBody>
-          <a:bodyPr/>
+        <p:spPr>
+          <a:xfrm>
+            <a:off x="640080" y="1371600"/>
+            <a:ext cx="10890928" cy="971550"/>
+          </a:xfrm>
+        </p:spPr>
+        <p:txBody>
+          <a:bodyPr vert="horz" lIns="91440" tIns="45720" rIns="91440" bIns="45720" rtlCol="0" anchor="t">
+            <a:normAutofit/>
+          </a:bodyPr>
+          <a:lstStyle/>
+          <a:p>
+            <a:r>
+              <a:rPr lang="en-US"/>
+              <a:t>Game Master Creating a Game Group</a:t>
+            </a:r>
+            <a:endParaRPr lang="en-US" dirty="0"/>
+          </a:p>
+        </p:txBody>
+      </p:sp>
+      <p:cxnSp>
+        <p:nvCxnSpPr>
+          <p:cNvPr id="19" name="Straight Connector 18">
+            <a:extLst>
+              <a:ext uri="{FF2B5EF4-FFF2-40B4-BE49-F238E27FC236}">
+                <a16:creationId xmlns:a16="http://schemas.microsoft.com/office/drawing/2014/main" id="{39AA7464-1EB7-A869-C7D3-AA680BBA984A}"/>
+              </a:ext>
+              <a:ext uri="{C183D7F6-B498-43B3-948B-1728B52AA6E4}">
+                <adec:decorative xmlns:adec="http://schemas.microsoft.com/office/drawing/2017/decorative" val="1"/>
+              </a:ext>
+            </a:extLst>
+          </p:cNvPr>
+          <p:cNvCxnSpPr>
+            <a:cxnSpLocks noGrp="1" noRot="1" noChangeAspect="1" noMove="1" noResize="1" noEditPoints="1" noAdjustHandles="1" noChangeArrowheads="1" noChangeShapeType="1"/>
+          </p:cNvCxnSpPr>
+          <p:nvPr>
+            <p:extLst>
+              <p:ext uri="{386F3935-93C4-4BCD-93E2-E3B085C9AB24}">
+                <p16:designElem xmlns:p16="http://schemas.microsoft.com/office/powerpoint/2015/main" val="1"/>
+              </p:ext>
+            </p:extLst>
+          </p:nvPr>
+        </p:nvCxnSpPr>
+        <p:spPr>
+          <a:xfrm>
+            <a:off x="713232" y="1031001"/>
+            <a:ext cx="978862" cy="0"/>
+          </a:xfrm>
+          <a:prstGeom prst="line">
+            <a:avLst/>
+          </a:prstGeom>
+          <a:ln w="76200"/>
+        </p:spPr>
+        <p:style>
+          <a:lnRef idx="1">
+            <a:schemeClr val="accent1"/>
+          </a:lnRef>
+          <a:fillRef idx="0">
+            <a:schemeClr val="accent1"/>
+          </a:fillRef>
+          <a:effectRef idx="0">
+            <a:schemeClr val="accent1"/>
+          </a:effectRef>
+          <a:fontRef idx="minor">
+            <a:schemeClr val="tx1"/>
+          </a:fontRef>
+        </p:style>
+      </p:cxnSp>
+      <p:pic>
+        <p:nvPicPr>
+          <p:cNvPr id="10" name="Content Placeholder 9" descr="A screenshot of a computer&#10;&#10;AI-generated content may be incorrect.">
+            <a:extLst>
+              <a:ext uri="{FF2B5EF4-FFF2-40B4-BE49-F238E27FC236}">
+                <a16:creationId xmlns:a16="http://schemas.microsoft.com/office/drawing/2014/main" id="{89FC2060-F0BB-BDD9-FC1A-FC7BF12EA827}"/>
+              </a:ext>
+            </a:extLst>
+          </p:cNvPr>
+          <p:cNvPicPr>
+            <a:picLocks noGrp="1" noChangeAspect="1"/>
+          </p:cNvPicPr>
+          <p:nvPr>
+            <p:ph sz="half" idx="2"/>
+          </p:nvPr>
+        </p:nvPicPr>
+        <p:blipFill>
+          <a:blip r:embed="rId2">
+            <a:extLst>
+              <a:ext uri="{28A0092B-C50C-407E-A947-70E740481C1C}">
+                <a14:useLocalDpi xmlns:a14="http://schemas.microsoft.com/office/drawing/2010/main" val="0"/>
+              </a:ext>
+            </a:extLst>
+          </a:blip>
+          <a:stretch>
+            <a:fillRect/>
+          </a:stretch>
+        </p:blipFill>
+        <p:spPr>
+          <a:xfrm>
+            <a:off x="713232" y="2913859"/>
+            <a:ext cx="5648193" cy="3007661"/>
+          </a:xfrm>
+          <a:prstGeom prst="rect">
+            <a:avLst/>
+          </a:prstGeom>
+        </p:spPr>
+      </p:pic>
+      <p:sp>
+        <p:nvSpPr>
+          <p:cNvPr id="3" name="Content Placeholder 2">
+            <a:extLst>
+              <a:ext uri="{FF2B5EF4-FFF2-40B4-BE49-F238E27FC236}">
+                <a16:creationId xmlns:a16="http://schemas.microsoft.com/office/drawing/2014/main" id="{95C03367-319B-5244-8F1C-9DD5B1650720}"/>
+              </a:ext>
+            </a:extLst>
+          </p:cNvPr>
+          <p:cNvSpPr>
+            <a:spLocks noGrp="1"/>
+          </p:cNvSpPr>
+          <p:nvPr>
+            <p:ph sz="half" idx="1"/>
+          </p:nvPr>
+        </p:nvSpPr>
+        <p:spPr>
+          <a:xfrm>
+            <a:off x="6871063" y="2537460"/>
+            <a:ext cx="4659945" cy="3760459"/>
+          </a:xfrm>
+        </p:spPr>
+        <p:txBody>
+          <a:bodyPr vert="horz" lIns="91440" tIns="45720" rIns="91440" bIns="45720" rtlCol="0" anchor="t">
+            <a:normAutofit/>
+          </a:bodyPr>
           <a:lstStyle/>
           <a:p>
             <a:r>
               <a:rPr lang="en-US" dirty="0"/>
-              <a:t>Game Master Use Case</a:t>
-            </a:r>
-          </a:p>
-        </p:txBody>
-      </p:sp>
-      <p:sp>
-        <p:nvSpPr>
-          <p:cNvPr id="3" name="Content Placeholder 2">
-            <a:extLst>
-              <a:ext uri="{FF2B5EF4-FFF2-40B4-BE49-F238E27FC236}">
-                <a16:creationId xmlns:a16="http://schemas.microsoft.com/office/drawing/2014/main" id="{95C03367-319B-5244-8F1C-9DD5B1650720}"/>
-              </a:ext>
-            </a:extLst>
-          </p:cNvPr>
-          <p:cNvSpPr>
-            <a:spLocks noGrp="1"/>
-          </p:cNvSpPr>
-          <p:nvPr>
-            <p:ph sz="half" idx="1"/>
-          </p:nvPr>
-        </p:nvSpPr>
-        <p:spPr/>
-        <p:txBody>
-          <a:bodyPr/>
-          <a:lstStyle/>
-          <a:p>
-            <a:endParaRPr lang="en-US"/>
-          </a:p>
-        </p:txBody>
-      </p:sp>
-      <p:sp>
-        <p:nvSpPr>
-          <p:cNvPr id="4" name="Content Placeholder 3">
-            <a:extLst>
-              <a:ext uri="{FF2B5EF4-FFF2-40B4-BE49-F238E27FC236}">
-                <a16:creationId xmlns:a16="http://schemas.microsoft.com/office/drawing/2014/main" id="{4BB6D2E1-8E1B-828F-00BD-5D26C0931EE1}"/>
-              </a:ext>
-            </a:extLst>
-          </p:cNvPr>
-          <p:cNvSpPr>
-            <a:spLocks noGrp="1"/>
-          </p:cNvSpPr>
-          <p:nvPr>
-            <p:ph sz="half" idx="2"/>
-          </p:nvPr>
-        </p:nvSpPr>
-        <p:spPr/>
-        <p:txBody>
-          <a:bodyPr/>
-          <a:lstStyle/>
-          <a:p>
-            <a:endParaRPr lang="en-US"/>
+              <a:t>On this page, a game master user can create a game group, which would be added to a database of all game group.</a:t>
+            </a:r>
+          </a:p>
+          <a:p>
+            <a:r>
+              <a:rPr lang="en-US" dirty="0"/>
+              <a:t>They will need to enter all the information, which includes the location, the day of the week the game will be played, start/end time, number of player slots, and the description.</a:t>
+            </a:r>
           </a:p>
         </p:txBody>
       </p:sp>
@@ -4344,6 +4566,14 @@
 <file path=ppt/slides/slide5.xml><?xml version="1.0" encoding="utf-8"?>
 <p:sld xmlns:a="http://schemas.openxmlformats.org/drawingml/2006/main" xmlns:r="http://schemas.openxmlformats.org/officeDocument/2006/relationships" xmlns:p="http://schemas.openxmlformats.org/presentationml/2006/main">
   <p:cSld>
+    <p:bg>
+      <p:bgPr>
+        <a:solidFill>
+          <a:schemeClr val="bg1"/>
+        </a:solidFill>
+        <a:effectLst/>
+      </p:bgPr>
+    </p:bg>
     <p:spTree>
       <p:nvGrpSpPr>
         <p:cNvPr id="1" name=""/>
@@ -4358,6 +4588,130 @@
           <a:chExt cx="0" cy="0"/>
         </a:xfrm>
       </p:grpSpPr>
+      <p:cxnSp>
+        <p:nvCxnSpPr>
+          <p:cNvPr id="11" name="Straight Connector 10">
+            <a:extLst>
+              <a:ext uri="{FF2B5EF4-FFF2-40B4-BE49-F238E27FC236}">
+                <a16:creationId xmlns:a16="http://schemas.microsoft.com/office/drawing/2014/main" id="{118E06E4-607B-144B-382B-AD3D06B1EE8C}"/>
+              </a:ext>
+              <a:ext uri="{C183D7F6-B498-43B3-948B-1728B52AA6E4}">
+                <adec:decorative xmlns:adec="http://schemas.microsoft.com/office/drawing/2017/decorative" val="1"/>
+              </a:ext>
+            </a:extLst>
+          </p:cNvPr>
+          <p:cNvCxnSpPr>
+            <a:cxnSpLocks noGrp="1" noRot="1" noChangeAspect="1" noMove="1" noResize="1" noEditPoints="1" noAdjustHandles="1" noChangeArrowheads="1" noChangeShapeType="1"/>
+          </p:cNvCxnSpPr>
+          <p:nvPr>
+            <p:extLst>
+              <p:ext uri="{386F3935-93C4-4BCD-93E2-E3B085C9AB24}">
+                <p16:designElem xmlns:p16="http://schemas.microsoft.com/office/powerpoint/2015/main" val="1"/>
+              </p:ext>
+            </p:extLst>
+          </p:nvPr>
+        </p:nvCxnSpPr>
+        <p:spPr>
+          <a:xfrm>
+            <a:off x="713232" y="1031001"/>
+            <a:ext cx="978862" cy="0"/>
+          </a:xfrm>
+          <a:prstGeom prst="line">
+            <a:avLst/>
+          </a:prstGeom>
+          <a:ln w="76200"/>
+        </p:spPr>
+        <p:style>
+          <a:lnRef idx="1">
+            <a:schemeClr val="accent1"/>
+          </a:lnRef>
+          <a:fillRef idx="0">
+            <a:schemeClr val="accent1"/>
+          </a:fillRef>
+          <a:effectRef idx="0">
+            <a:schemeClr val="accent1"/>
+          </a:effectRef>
+          <a:fontRef idx="minor">
+            <a:schemeClr val="tx1"/>
+          </a:fontRef>
+        </p:style>
+      </p:cxnSp>
+      <p:sp useBgFill="1">
+        <p:nvSpPr>
+          <p:cNvPr id="13" name="Rectangle 12">
+            <a:extLst>
+              <a:ext uri="{FF2B5EF4-FFF2-40B4-BE49-F238E27FC236}">
+                <a16:creationId xmlns:a16="http://schemas.microsoft.com/office/drawing/2014/main" id="{DBDA151C-5770-45E4-AAFF-59E7F403866D}"/>
+              </a:ext>
+              <a:ext uri="{C183D7F6-B498-43B3-948B-1728B52AA6E4}">
+                <adec:decorative xmlns:adec="http://schemas.microsoft.com/office/drawing/2017/decorative" val="1"/>
+              </a:ext>
+            </a:extLst>
+          </p:cNvPr>
+          <p:cNvSpPr>
+            <a:spLocks noGrp="1" noRot="1" noChangeAspect="1" noMove="1" noResize="1" noEditPoints="1" noAdjustHandles="1" noChangeArrowheads="1" noChangeShapeType="1" noTextEdit="1"/>
+          </p:cNvSpPr>
+          <p:nvPr>
+            <p:extLst>
+              <p:ext uri="{386F3935-93C4-4BCD-93E2-E3B085C9AB24}">
+                <p16:designElem xmlns:p16="http://schemas.microsoft.com/office/powerpoint/2015/main" val="1"/>
+              </p:ext>
+            </p:extLst>
+          </p:nvPr>
+        </p:nvSpPr>
+        <p:spPr>
+          <a:xfrm>
+            <a:off x="0" y="0"/>
+            <a:ext cx="12192000" cy="6858000"/>
+          </a:xfrm>
+          <a:prstGeom prst="rect">
+            <a:avLst/>
+          </a:prstGeom>
+          <a:ln w="12700" cap="flat" cmpd="sng" algn="ctr">
+            <a:noFill/>
+            <a:prstDash val="solid"/>
+            <a:miter lim="800000"/>
+          </a:ln>
+          <a:effectLst/>
+          <a:extLst>
+            <a:ext uri="{91240B29-F687-4F45-9708-019B960494DF}">
+              <a14:hiddenLine xmlns:a14="http://schemas.microsoft.com/office/drawing/2010/main" w="12700" cap="flat" cmpd="sng" algn="ctr">
+                <a:solidFill>
+                  <a:schemeClr val="accent1">
+                    <a:shade val="50000"/>
+                  </a:schemeClr>
+                </a:solidFill>
+                <a:prstDash val="solid"/>
+                <a:miter lim="800000"/>
+              </a14:hiddenLine>
+            </a:ext>
+          </a:extLst>
+        </p:spPr>
+        <p:style>
+          <a:lnRef idx="2">
+            <a:schemeClr val="accent1">
+              <a:shade val="50000"/>
+            </a:schemeClr>
+          </a:lnRef>
+          <a:fillRef idx="1">
+            <a:schemeClr val="accent1"/>
+          </a:fillRef>
+          <a:effectRef idx="0">
+            <a:schemeClr val="accent1"/>
+          </a:effectRef>
+          <a:fontRef idx="minor">
+            <a:schemeClr val="lt1"/>
+          </a:fontRef>
+        </p:style>
+        <p:txBody>
+          <a:bodyPr rtlCol="0" anchor="ctr"/>
+          <a:lstStyle/>
+          <a:p>
+            <a:pPr algn="ctr"/>
+            <a:endParaRPr lang="en-US" dirty="0"/>
+          </a:p>
+        </p:txBody>
+      </p:sp>
       <p:sp>
         <p:nvSpPr>
           <p:cNvPr id="2" name="Title 1">
@@ -4374,18 +4728,111 @@
             <p:ph type="title"/>
           </p:nvPr>
         </p:nvSpPr>
-        <p:spPr/>
-        <p:txBody>
-          <a:bodyPr/>
+        <p:spPr>
+          <a:xfrm>
+            <a:off x="640080" y="1371600"/>
+            <a:ext cx="10890928" cy="971550"/>
+          </a:xfrm>
+        </p:spPr>
+        <p:txBody>
+          <a:bodyPr vert="horz" lIns="91440" tIns="45720" rIns="91440" bIns="45720" rtlCol="0" anchor="t">
+            <a:normAutofit/>
+          </a:bodyPr>
           <a:lstStyle/>
           <a:p>
             <a:r>
               <a:rPr lang="en-US" dirty="0"/>
-              <a:t>Game Master Use Case</a:t>
-            </a:r>
-          </a:p>
-        </p:txBody>
-      </p:sp>
+              <a:t>Game Master Viewing Their Game Group</a:t>
+            </a:r>
+          </a:p>
+        </p:txBody>
+      </p:sp>
+      <p:cxnSp>
+        <p:nvCxnSpPr>
+          <p:cNvPr id="15" name="Straight Connector 14">
+            <a:extLst>
+              <a:ext uri="{FF2B5EF4-FFF2-40B4-BE49-F238E27FC236}">
+                <a16:creationId xmlns:a16="http://schemas.microsoft.com/office/drawing/2014/main" id="{39AA7464-1EB7-A869-C7D3-AA680BBA984A}"/>
+              </a:ext>
+              <a:ext uri="{C183D7F6-B498-43B3-948B-1728B52AA6E4}">
+                <adec:decorative xmlns:adec="http://schemas.microsoft.com/office/drawing/2017/decorative" val="1"/>
+              </a:ext>
+            </a:extLst>
+          </p:cNvPr>
+          <p:cNvCxnSpPr>
+            <a:cxnSpLocks noGrp="1" noRot="1" noChangeAspect="1" noMove="1" noResize="1" noEditPoints="1" noAdjustHandles="1" noChangeArrowheads="1" noChangeShapeType="1"/>
+          </p:cNvCxnSpPr>
+          <p:nvPr>
+            <p:extLst>
+              <p:ext uri="{386F3935-93C4-4BCD-93E2-E3B085C9AB24}">
+                <p16:designElem xmlns:p16="http://schemas.microsoft.com/office/powerpoint/2015/main" val="1"/>
+              </p:ext>
+            </p:extLst>
+          </p:nvPr>
+        </p:nvCxnSpPr>
+        <p:spPr>
+          <a:xfrm>
+            <a:off x="713232" y="1031001"/>
+            <a:ext cx="978862" cy="0"/>
+          </a:xfrm>
+          <a:prstGeom prst="line">
+            <a:avLst/>
+          </a:prstGeom>
+          <a:ln w="76200"/>
+        </p:spPr>
+        <p:style>
+          <a:lnRef idx="1">
+            <a:schemeClr val="accent1"/>
+          </a:lnRef>
+          <a:fillRef idx="0">
+            <a:schemeClr val="accent1"/>
+          </a:fillRef>
+          <a:effectRef idx="0">
+            <a:schemeClr val="accent1"/>
+          </a:effectRef>
+          <a:fontRef idx="minor">
+            <a:schemeClr val="tx1"/>
+          </a:fontRef>
+        </p:style>
+      </p:cxnSp>
+      <p:pic>
+        <p:nvPicPr>
+          <p:cNvPr id="6" name="Content Placeholder 5" descr="A screenshot of a computer&#10;&#10;AI-generated content may be incorrect.">
+            <a:extLst>
+              <a:ext uri="{FF2B5EF4-FFF2-40B4-BE49-F238E27FC236}">
+                <a16:creationId xmlns:a16="http://schemas.microsoft.com/office/drawing/2014/main" id="{AA2BCE50-646E-B480-02C2-B73ADCD1DF44}"/>
+              </a:ext>
+            </a:extLst>
+          </p:cNvPr>
+          <p:cNvPicPr>
+            <a:picLocks noGrp="1" noChangeAspect="1"/>
+          </p:cNvPicPr>
+          <p:nvPr>
+            <p:ph sz="half" idx="2"/>
+          </p:nvPr>
+        </p:nvPicPr>
+        <p:blipFill>
+          <a:blip r:embed="rId2">
+            <a:extLst>
+              <a:ext uri="{28A0092B-C50C-407E-A947-70E740481C1C}">
+                <a14:useLocalDpi xmlns:a14="http://schemas.microsoft.com/office/drawing/2010/main" val="0"/>
+              </a:ext>
+            </a:extLst>
+          </a:blip>
+          <a:stretch>
+            <a:fillRect/>
+          </a:stretch>
+        </p:blipFill>
+        <p:spPr>
+          <a:xfrm>
+            <a:off x="713232" y="2913859"/>
+            <a:ext cx="5648193" cy="3007661"/>
+          </a:xfrm>
+          <a:prstGeom prst="rect">
+            <a:avLst/>
+          </a:prstGeom>
+        </p:spPr>
+      </p:pic>
       <p:sp>
         <p:nvSpPr>
           <p:cNvPr id="3" name="Content Placeholder 2">
@@ -4402,37 +4849,34 @@
             <p:ph sz="half" idx="1"/>
           </p:nvPr>
         </p:nvSpPr>
-        <p:spPr/>
-        <p:txBody>
-          <a:bodyPr/>
-          <a:lstStyle/>
-          <a:p>
-            <a:endParaRPr lang="en-US"/>
-          </a:p>
-        </p:txBody>
-      </p:sp>
-      <p:sp>
-        <p:nvSpPr>
-          <p:cNvPr id="4" name="Content Placeholder 3">
-            <a:extLst>
-              <a:ext uri="{FF2B5EF4-FFF2-40B4-BE49-F238E27FC236}">
-                <a16:creationId xmlns:a16="http://schemas.microsoft.com/office/drawing/2014/main" id="{035772CE-2162-9C28-EDA8-7726D587EF1D}"/>
-              </a:ext>
-            </a:extLst>
-          </p:cNvPr>
-          <p:cNvSpPr>
-            <a:spLocks noGrp="1"/>
-          </p:cNvSpPr>
-          <p:nvPr>
-            <p:ph sz="half" idx="2"/>
-          </p:nvPr>
-        </p:nvSpPr>
-        <p:spPr/>
-        <p:txBody>
-          <a:bodyPr/>
-          <a:lstStyle/>
-          <a:p>
-            <a:endParaRPr lang="en-US"/>
+        <p:spPr>
+          <a:xfrm>
+            <a:off x="6871063" y="2537460"/>
+            <a:ext cx="4659945" cy="3760459"/>
+          </a:xfrm>
+        </p:spPr>
+        <p:txBody>
+          <a:bodyPr vert="horz" lIns="91440" tIns="45720" rIns="91440" bIns="45720" rtlCol="0" anchor="t">
+            <a:normAutofit/>
+          </a:bodyPr>
+          <a:lstStyle/>
+          <a:p>
+            <a:r>
+              <a:rPr lang="en-US" dirty="0"/>
+              <a:t>This page allows a Game Master user to view all game groups that they are the game master of.</a:t>
+            </a:r>
+          </a:p>
+          <a:p>
+            <a:r>
+              <a:rPr lang="en-US" dirty="0"/>
+              <a:t>This would include all the information they entered before, plus any Player users that may have joined.</a:t>
+            </a:r>
+          </a:p>
+          <a:p>
+            <a:r>
+              <a:rPr lang="en-US" dirty="0"/>
+              <a:t>This page will also allow a Game Master user to kick a player from one of their game groups</a:t>
+            </a:r>
           </a:p>
         </p:txBody>
       </p:sp>

</xml_diff>

<commit_message>
Changed one of the use cases for GM users in power point to reflect what is in our Read Me file.
</commit_message>
<xml_diff>
--- a/D&D Group Finder.pptx
+++ b/D&D Group Finder.pptx
@@ -4590,7 +4590,7 @@
       </p:grpSpPr>
       <p:cxnSp>
         <p:nvCxnSpPr>
-          <p:cNvPr id="11" name="Straight Connector 10">
+          <p:cNvPr id="29" name="Straight Connector 28">
             <a:extLst>
               <a:ext uri="{FF2B5EF4-FFF2-40B4-BE49-F238E27FC236}">
                 <a16:creationId xmlns:a16="http://schemas.microsoft.com/office/drawing/2014/main" id="{118E06E4-607B-144B-382B-AD3D06B1EE8C}"/>
@@ -4638,7 +4638,7 @@
       </p:cxnSp>
       <p:sp useBgFill="1">
         <p:nvSpPr>
-          <p:cNvPr id="13" name="Rectangle 12">
+          <p:cNvPr id="31" name="Rectangle 30">
             <a:extLst>
               <a:ext uri="{FF2B5EF4-FFF2-40B4-BE49-F238E27FC236}">
                 <a16:creationId xmlns:a16="http://schemas.microsoft.com/office/drawing/2014/main" id="{DBDA151C-5770-45E4-AAFF-59E7F403866D}"/>
@@ -4741,15 +4741,15 @@
           <a:lstStyle/>
           <a:p>
             <a:r>
-              <a:rPr lang="en-US" dirty="0"/>
-              <a:t>Game Master Viewing Their Game Group</a:t>
+              <a:rPr lang="en-US" sz="3700" dirty="0"/>
+              <a:t>Game Master Viewing the Game Groups of a Player</a:t>
             </a:r>
           </a:p>
         </p:txBody>
       </p:sp>
       <p:cxnSp>
         <p:nvCxnSpPr>
-          <p:cNvPr id="15" name="Straight Connector 14">
+          <p:cNvPr id="33" name="Straight Connector 32">
             <a:extLst>
               <a:ext uri="{FF2B5EF4-FFF2-40B4-BE49-F238E27FC236}">
                 <a16:creationId xmlns:a16="http://schemas.microsoft.com/office/drawing/2014/main" id="{39AA7464-1EB7-A869-C7D3-AA680BBA984A}"/>
@@ -4797,10 +4797,10 @@
       </p:cxnSp>
       <p:pic>
         <p:nvPicPr>
-          <p:cNvPr id="6" name="Content Placeholder 5" descr="A screenshot of a computer&#10;&#10;AI-generated content may be incorrect.">
-            <a:extLst>
-              <a:ext uri="{FF2B5EF4-FFF2-40B4-BE49-F238E27FC236}">
-                <a16:creationId xmlns:a16="http://schemas.microsoft.com/office/drawing/2014/main" id="{AA2BCE50-646E-B480-02C2-B73ADCD1DF44}"/>
+          <p:cNvPr id="14" name="Content Placeholder 13" descr="A screenshot of a computer&#10;&#10;AI-generated content may be incorrect.">
+            <a:extLst>
+              <a:ext uri="{FF2B5EF4-FFF2-40B4-BE49-F238E27FC236}">
+                <a16:creationId xmlns:a16="http://schemas.microsoft.com/office/drawing/2014/main" id="{11BD8D1A-D42F-C579-2BBB-6A78102EF1E7}"/>
               </a:ext>
             </a:extLst>
           </p:cNvPr>
@@ -4863,19 +4863,19 @@
           <a:p>
             <a:r>
               <a:rPr lang="en-US" dirty="0"/>
-              <a:t>This page allows a Game Master user to view all game groups that they are the game master of.</a:t>
+              <a:t>This page allows a Game Master user to view all game groups of a specific Player user.</a:t>
             </a:r>
           </a:p>
           <a:p>
             <a:r>
               <a:rPr lang="en-US" dirty="0"/>
-              <a:t>This would include all the information they entered before, plus any Player users that may have joined.</a:t>
+              <a:t>This will display all the relevant data about each game group.</a:t>
             </a:r>
           </a:p>
           <a:p>
             <a:r>
               <a:rPr lang="en-US" dirty="0"/>
-              <a:t>This page will also allow a Game Master user to kick a player from one of their game groups</a:t>
+              <a:t>This would allow them to see if there are any schedule conflicts with said Player user, either from time or location.</a:t>
             </a:r>
           </a:p>
         </p:txBody>

</xml_diff>